<commit_message>
FAQ, problemas en el buscador, CSS ok
</commit_message>
<xml_diff>
--- a/travelData - Παρουσίαση1.pptx
+++ b/travelData - Παρουσίαση1.pptx
@@ -9,6 +9,8 @@
     <p:sldId id="257" r:id="rId3"/>
     <p:sldId id="258" r:id="rId4"/>
     <p:sldId id="259" r:id="rId5"/>
+    <p:sldId id="260" r:id="rId6"/>
+    <p:sldId id="261" r:id="rId7"/>
   </p:sldIdLst>
   <p:sldSz cx="12192000" cy="6858000"/>
   <p:notesSz cx="6858000" cy="9144000"/>
@@ -107,6 +109,11 @@
       </a:defRPr>
     </a:lvl9pPr>
   </p:defaultTextStyle>
+  <p:extLst>
+    <p:ext uri="{EFAFB233-063F-42B5-8137-9DF3F51BA10A}">
+      <p15:sldGuideLst xmlns:p15="http://schemas.microsoft.com/office/powerpoint/2012/main"/>
+    </p:ext>
+  </p:extLst>
 </p:presentation>
 </file>
 
@@ -334,7 +341,7 @@
           <a:p>
             <a:fld id="{634978AB-507F-4326-A1A0-808CE0A1FA67}" type="datetimeFigureOut">
               <a:rPr lang="el-GR" smtClean="0"/>
-              <a:t>12/10/2020</a:t>
+              <a:t>13/10/2020</a:t>
             </a:fld>
             <a:endParaRPr lang="el-GR"/>
           </a:p>
@@ -504,7 +511,7 @@
           <a:p>
             <a:fld id="{634978AB-507F-4326-A1A0-808CE0A1FA67}" type="datetimeFigureOut">
               <a:rPr lang="el-GR" smtClean="0"/>
-              <a:t>12/10/2020</a:t>
+              <a:t>13/10/2020</a:t>
             </a:fld>
             <a:endParaRPr lang="el-GR"/>
           </a:p>
@@ -684,7 +691,7 @@
           <a:p>
             <a:fld id="{634978AB-507F-4326-A1A0-808CE0A1FA67}" type="datetimeFigureOut">
               <a:rPr lang="el-GR" smtClean="0"/>
-              <a:t>12/10/2020</a:t>
+              <a:t>13/10/2020</a:t>
             </a:fld>
             <a:endParaRPr lang="el-GR"/>
           </a:p>
@@ -854,7 +861,7 @@
           <a:p>
             <a:fld id="{634978AB-507F-4326-A1A0-808CE0A1FA67}" type="datetimeFigureOut">
               <a:rPr lang="el-GR" smtClean="0"/>
-              <a:t>12/10/2020</a:t>
+              <a:t>13/10/2020</a:t>
             </a:fld>
             <a:endParaRPr lang="el-GR"/>
           </a:p>
@@ -1112,7 +1119,7 @@
           <a:p>
             <a:fld id="{634978AB-507F-4326-A1A0-808CE0A1FA67}" type="datetimeFigureOut">
               <a:rPr lang="el-GR" smtClean="0"/>
-              <a:t>12/10/2020</a:t>
+              <a:t>13/10/2020</a:t>
             </a:fld>
             <a:endParaRPr lang="el-GR"/>
           </a:p>
@@ -1400,7 +1407,7 @@
           <a:p>
             <a:fld id="{634978AB-507F-4326-A1A0-808CE0A1FA67}" type="datetimeFigureOut">
               <a:rPr lang="el-GR" smtClean="0"/>
-              <a:t>12/10/2020</a:t>
+              <a:t>13/10/2020</a:t>
             </a:fld>
             <a:endParaRPr lang="el-GR"/>
           </a:p>
@@ -1842,7 +1849,7 @@
           <a:p>
             <a:fld id="{634978AB-507F-4326-A1A0-808CE0A1FA67}" type="datetimeFigureOut">
               <a:rPr lang="el-GR" smtClean="0"/>
-              <a:t>12/10/2020</a:t>
+              <a:t>13/10/2020</a:t>
             </a:fld>
             <a:endParaRPr lang="el-GR"/>
           </a:p>
@@ -1960,7 +1967,7 @@
           <a:p>
             <a:fld id="{634978AB-507F-4326-A1A0-808CE0A1FA67}" type="datetimeFigureOut">
               <a:rPr lang="el-GR" smtClean="0"/>
-              <a:t>12/10/2020</a:t>
+              <a:t>13/10/2020</a:t>
             </a:fld>
             <a:endParaRPr lang="el-GR"/>
           </a:p>
@@ -2055,7 +2062,7 @@
           <a:p>
             <a:fld id="{634978AB-507F-4326-A1A0-808CE0A1FA67}" type="datetimeFigureOut">
               <a:rPr lang="el-GR" smtClean="0"/>
-              <a:t>12/10/2020</a:t>
+              <a:t>13/10/2020</a:t>
             </a:fld>
             <a:endParaRPr lang="el-GR"/>
           </a:p>
@@ -2343,7 +2350,7 @@
           <a:p>
             <a:fld id="{634978AB-507F-4326-A1A0-808CE0A1FA67}" type="datetimeFigureOut">
               <a:rPr lang="el-GR" smtClean="0"/>
-              <a:t>12/10/2020</a:t>
+              <a:t>13/10/2020</a:t>
             </a:fld>
             <a:endParaRPr lang="el-GR"/>
           </a:p>
@@ -2616,7 +2623,7 @@
           <a:p>
             <a:fld id="{634978AB-507F-4326-A1A0-808CE0A1FA67}" type="datetimeFigureOut">
               <a:rPr lang="el-GR" smtClean="0"/>
-              <a:t>12/10/2020</a:t>
+              <a:t>13/10/2020</a:t>
             </a:fld>
             <a:endParaRPr lang="el-GR"/>
           </a:p>
@@ -2913,7 +2920,7 @@
           <a:p>
             <a:fld id="{634978AB-507F-4326-A1A0-808CE0A1FA67}" type="datetimeFigureOut">
               <a:rPr lang="el-GR" smtClean="0"/>
-              <a:t>12/10/2020</a:t>
+              <a:t>13/10/2020</a:t>
             </a:fld>
             <a:endParaRPr lang="el-GR"/>
           </a:p>
@@ -3891,6 +3898,292 @@
 </p:sld>
 </file>
 
+<file path=ppt/slides/slide5.xml><?xml version="1.0" encoding="utf-8"?>
+<p:sld xmlns:a="http://schemas.openxmlformats.org/drawingml/2006/main" xmlns:r="http://schemas.openxmlformats.org/officeDocument/2006/relationships" xmlns:p="http://schemas.openxmlformats.org/presentationml/2006/main">
+  <p:cSld>
+    <p:spTree>
+      <p:nvGrpSpPr>
+        <p:cNvPr id="1" name=""/>
+        <p:cNvGrpSpPr/>
+        <p:nvPr/>
+      </p:nvGrpSpPr>
+      <p:grpSpPr>
+        <a:xfrm>
+          <a:off x="0" y="0"/>
+          <a:ext cx="0" cy="0"/>
+          <a:chOff x="0" y="0"/>
+          <a:chExt cx="0" cy="0"/>
+        </a:xfrm>
+      </p:grpSpPr>
+      <p:sp>
+        <p:nvSpPr>
+          <p:cNvPr id="2" name="Τίτλος 1"/>
+          <p:cNvSpPr>
+            <a:spLocks noGrp="1"/>
+          </p:cNvSpPr>
+          <p:nvPr>
+            <p:ph type="title"/>
+          </p:nvPr>
+        </p:nvSpPr>
+        <p:spPr/>
+        <p:txBody>
+          <a:bodyPr/>
+          <a:lstStyle/>
+          <a:p>
+            <a:r>
+              <a:rPr lang="en-US" dirty="0" err="1" smtClean="0"/>
+              <a:t>Desaf</a:t>
+            </a:r>
+            <a:r>
+              <a:rPr lang="es-ES" dirty="0" err="1" smtClean="0"/>
+              <a:t>íos</a:t>
+            </a:r>
+            <a:r>
+              <a:rPr lang="es-ES" dirty="0" smtClean="0"/>
+              <a:t/>
+            </a:r>
+            <a:br>
+              <a:rPr lang="es-ES" dirty="0" smtClean="0"/>
+            </a:br>
+            <a:r>
+              <a:rPr lang="en-US" dirty="0" smtClean="0"/>
+              <a:t> </a:t>
+            </a:r>
+            <a:endParaRPr lang="el-GR" dirty="0"/>
+          </a:p>
+        </p:txBody>
+      </p:sp>
+      <p:sp>
+        <p:nvSpPr>
+          <p:cNvPr id="3" name="Θέση περιεχομένου 2"/>
+          <p:cNvSpPr>
+            <a:spLocks noGrp="1"/>
+          </p:cNvSpPr>
+          <p:nvPr>
+            <p:ph idx="1"/>
+          </p:nvPr>
+        </p:nvSpPr>
+        <p:spPr/>
+        <p:txBody>
+          <a:bodyPr/>
+          <a:lstStyle/>
+          <a:p>
+            <a:endParaRPr lang="es-ES" dirty="0" smtClean="0"/>
+          </a:p>
+          <a:p>
+            <a:endParaRPr lang="es-ES" b="1" dirty="0" smtClean="0"/>
+          </a:p>
+          <a:p>
+            <a:endParaRPr lang="es-ES" b="1" dirty="0"/>
+          </a:p>
+          <a:p>
+            <a:endParaRPr lang="es-ES" b="1" dirty="0" smtClean="0"/>
+          </a:p>
+          <a:p>
+            <a:r>
+              <a:rPr lang="es-ES" b="1" dirty="0" smtClean="0"/>
+              <a:t>A nivel técnico</a:t>
+            </a:r>
+          </a:p>
+          <a:p>
+            <a:pPr marL="0" indent="0">
+              <a:buNone/>
+            </a:pPr>
+            <a:r>
+              <a:rPr lang="es-ES" dirty="0" smtClean="0"/>
+              <a:t>La llamada a la API y filtrar los datos</a:t>
+            </a:r>
+          </a:p>
+          <a:p>
+            <a:pPr marL="0" indent="0">
+              <a:buNone/>
+            </a:pPr>
+            <a:r>
+              <a:rPr lang="es-ES" dirty="0" smtClean="0"/>
+              <a:t>Mostrar los datos correctamente</a:t>
+            </a:r>
+          </a:p>
+          <a:p>
+            <a:pPr marL="0" indent="0">
+              <a:buNone/>
+            </a:pPr>
+            <a:r>
+              <a:rPr lang="es-ES" dirty="0" smtClean="0"/>
+              <a:t>El diseño de la página</a:t>
+            </a:r>
+          </a:p>
+          <a:p>
+            <a:pPr marL="0" indent="0">
+              <a:buNone/>
+            </a:pPr>
+            <a:endParaRPr lang="es-ES" dirty="0"/>
+          </a:p>
+          <a:p>
+            <a:pPr marL="0" indent="0">
+              <a:buNone/>
+            </a:pPr>
+            <a:r>
+              <a:rPr lang="es-ES" b="1" dirty="0" smtClean="0"/>
+              <a:t>A nivel personal</a:t>
+            </a:r>
+          </a:p>
+          <a:p>
+            <a:pPr marL="0" indent="0">
+              <a:buNone/>
+            </a:pPr>
+            <a:r>
+              <a:rPr lang="es-ES" dirty="0" smtClean="0"/>
+              <a:t>Lidiar con mi estrés </a:t>
+            </a:r>
+            <a:r>
+              <a:rPr lang="es-ES" dirty="0" smtClean="0">
+                <a:sym typeface="Wingdings" panose="05000000000000000000" pitchFamily="2" charset="2"/>
+              </a:rPr>
+              <a:t></a:t>
+            </a:r>
+            <a:endParaRPr lang="es-ES" dirty="0"/>
+          </a:p>
+          <a:p>
+            <a:pPr marL="0" indent="0">
+              <a:buNone/>
+            </a:pPr>
+            <a:endParaRPr lang="es-ES" dirty="0" smtClean="0"/>
+          </a:p>
+          <a:p>
+            <a:endParaRPr lang="es-ES" dirty="0" smtClean="0"/>
+          </a:p>
+          <a:p>
+            <a:endParaRPr lang="es-ES" dirty="0" smtClean="0">
+              <a:sym typeface="Wingdings" panose="05000000000000000000" pitchFamily="2" charset="2"/>
+            </a:endParaRPr>
+          </a:p>
+          <a:p>
+            <a:endParaRPr lang="es-ES" dirty="0">
+              <a:sym typeface="Wingdings" panose="05000000000000000000" pitchFamily="2" charset="2"/>
+            </a:endParaRPr>
+          </a:p>
+          <a:p>
+            <a:endParaRPr lang="es-ES" dirty="0" smtClean="0"/>
+          </a:p>
+          <a:p>
+            <a:endParaRPr lang="el-GR" dirty="0"/>
+          </a:p>
+        </p:txBody>
+      </p:sp>
+    </p:spTree>
+    <p:extLst>
+      <p:ext uri="{BB962C8B-B14F-4D97-AF65-F5344CB8AC3E}">
+        <p14:creationId xmlns:p14="http://schemas.microsoft.com/office/powerpoint/2010/main" val="552777016"/>
+      </p:ext>
+    </p:extLst>
+  </p:cSld>
+  <p:clrMapOvr>
+    <a:masterClrMapping/>
+  </p:clrMapOvr>
+</p:sld>
+</file>
+
+<file path=ppt/slides/slide6.xml><?xml version="1.0" encoding="utf-8"?>
+<p:sld xmlns:a="http://schemas.openxmlformats.org/drawingml/2006/main" xmlns:r="http://schemas.openxmlformats.org/officeDocument/2006/relationships" xmlns:p="http://schemas.openxmlformats.org/presentationml/2006/main">
+  <p:cSld>
+    <p:spTree>
+      <p:nvGrpSpPr>
+        <p:cNvPr id="1" name=""/>
+        <p:cNvGrpSpPr/>
+        <p:nvPr/>
+      </p:nvGrpSpPr>
+      <p:grpSpPr>
+        <a:xfrm>
+          <a:off x="0" y="0"/>
+          <a:ext cx="0" cy="0"/>
+          <a:chOff x="0" y="0"/>
+          <a:chExt cx="0" cy="0"/>
+        </a:xfrm>
+      </p:grpSpPr>
+      <p:sp>
+        <p:nvSpPr>
+          <p:cNvPr id="2" name="Τίτλος 1"/>
+          <p:cNvSpPr>
+            <a:spLocks noGrp="1"/>
+          </p:cNvSpPr>
+          <p:nvPr>
+            <p:ph type="title"/>
+          </p:nvPr>
+        </p:nvSpPr>
+        <p:spPr/>
+        <p:txBody>
+          <a:bodyPr/>
+          <a:lstStyle/>
+          <a:p>
+            <a:r>
+              <a:rPr lang="es-ES" dirty="0" smtClean="0"/>
+              <a:t>Aprendizajes</a:t>
+            </a:r>
+            <a:endParaRPr lang="el-GR" dirty="0"/>
+          </a:p>
+        </p:txBody>
+      </p:sp>
+      <p:sp>
+        <p:nvSpPr>
+          <p:cNvPr id="3" name="Θέση περιεχομένου 2"/>
+          <p:cNvSpPr>
+            <a:spLocks noGrp="1"/>
+          </p:cNvSpPr>
+          <p:nvPr>
+            <p:ph idx="1"/>
+          </p:nvPr>
+        </p:nvSpPr>
+        <p:spPr/>
+        <p:txBody>
+          <a:bodyPr/>
+          <a:lstStyle/>
+          <a:p>
+            <a:endParaRPr lang="es-ES" b="1" dirty="0"/>
+          </a:p>
+          <a:p>
+            <a:r>
+              <a:rPr lang="es-ES" b="1" dirty="0"/>
+              <a:t>A nivel técnico</a:t>
+            </a:r>
+          </a:p>
+          <a:p>
+            <a:pPr marL="0" indent="0">
+              <a:buNone/>
+            </a:pPr>
+            <a:r>
+              <a:rPr lang="es-ES" dirty="0" err="1" smtClean="0"/>
+              <a:t>Familiciarme</a:t>
+            </a:r>
+            <a:r>
+              <a:rPr lang="es-ES" dirty="0" smtClean="0"/>
+              <a:t> con HTML-CSS-JS</a:t>
+            </a:r>
+            <a:endParaRPr lang="es-ES" dirty="0"/>
+          </a:p>
+          <a:p>
+            <a:pPr marL="0" indent="0">
+              <a:buNone/>
+            </a:pPr>
+            <a:endParaRPr lang="es-ES" dirty="0"/>
+          </a:p>
+          <a:p>
+            <a:endParaRPr lang="el-GR" dirty="0"/>
+          </a:p>
+        </p:txBody>
+      </p:sp>
+    </p:spTree>
+    <p:extLst>
+      <p:ext uri="{BB962C8B-B14F-4D97-AF65-F5344CB8AC3E}">
+        <p14:creationId xmlns:p14="http://schemas.microsoft.com/office/powerpoint/2010/main" val="2949805060"/>
+      </p:ext>
+    </p:extLst>
+  </p:cSld>
+  <p:clrMapOvr>
+    <a:masterClrMapping/>
+  </p:clrMapOvr>
+</p:sld>
+</file>
+
 <file path=ppt/theme/theme1.xml><?xml version="1.0" encoding="utf-8"?>
 <a:theme xmlns:a="http://schemas.openxmlformats.org/drawingml/2006/main" name="Πλαίσιο">
   <a:themeElements>

</xml_diff>